<commit_message>
Update batch whitening code for LLMs
- Implement parallelized matrix-based computations (no Python loops)
- Add channel grouping using dynamic group sizes from get_batch_whitening_config()
- Preserve causality via leave-one-out (B) covariance matrices during training (one per sequence), and a single covariance matrix during inference
- Maintain a running covariance of shape (1, num_groups, group_size, group_size) shared across all sequences
- This supports changes in B during training and differences between training and inference
- During training, use batch covariances of shape (B, num_groups, group_size, group_size) mixed with the running covariance to whiten X, then average to a single covariance
- During inference, use the running covariance directly
- Scale off-diagonal covariance entries by (1 - epsilon) for de-correlation
</commit_message>
<xml_diff>
--- a/nlp/BW_gpt.pptx
+++ b/nlp/BW_gpt.pptx
@@ -6,9 +6,10 @@
   </p:sldMasterIdLst>
   <p:sldIdLst>
     <p:sldId id="256" r:id="rId2"/>
-    <p:sldId id="257" r:id="rId3"/>
-    <p:sldId id="258" r:id="rId4"/>
-    <p:sldId id="259" r:id="rId5"/>
+    <p:sldId id="260" r:id="rId3"/>
+    <p:sldId id="257" r:id="rId4"/>
+    <p:sldId id="258" r:id="rId5"/>
+    <p:sldId id="259" r:id="rId6"/>
   </p:sldIdLst>
   <p:sldSz cx="12192000" cy="6858000"/>
   <p:notesSz cx="6858000" cy="9144000"/>
@@ -264,7 +265,7 @@
           <a:p>
             <a:fld id="{11FE3B9D-47C6-4666-9B3D-CDF6210FE922}" type="datetimeFigureOut">
               <a:rPr lang="en-IL" smtClean="0"/>
-              <a:t>28/07/2024</a:t>
+              <a:t>01/12/2025</a:t>
             </a:fld>
             <a:endParaRPr lang="en-IL"/>
           </a:p>
@@ -464,7 +465,7 @@
           <a:p>
             <a:fld id="{11FE3B9D-47C6-4666-9B3D-CDF6210FE922}" type="datetimeFigureOut">
               <a:rPr lang="en-IL" smtClean="0"/>
-              <a:t>28/07/2024</a:t>
+              <a:t>01/12/2025</a:t>
             </a:fld>
             <a:endParaRPr lang="en-IL"/>
           </a:p>
@@ -674,7 +675,7 @@
           <a:p>
             <a:fld id="{11FE3B9D-47C6-4666-9B3D-CDF6210FE922}" type="datetimeFigureOut">
               <a:rPr lang="en-IL" smtClean="0"/>
-              <a:t>28/07/2024</a:t>
+              <a:t>01/12/2025</a:t>
             </a:fld>
             <a:endParaRPr lang="en-IL"/>
           </a:p>
@@ -874,7 +875,7 @@
           <a:p>
             <a:fld id="{11FE3B9D-47C6-4666-9B3D-CDF6210FE922}" type="datetimeFigureOut">
               <a:rPr lang="en-IL" smtClean="0"/>
-              <a:t>28/07/2024</a:t>
+              <a:t>01/12/2025</a:t>
             </a:fld>
             <a:endParaRPr lang="en-IL"/>
           </a:p>
@@ -1150,7 +1151,7 @@
           <a:p>
             <a:fld id="{11FE3B9D-47C6-4666-9B3D-CDF6210FE922}" type="datetimeFigureOut">
               <a:rPr lang="en-IL" smtClean="0"/>
-              <a:t>28/07/2024</a:t>
+              <a:t>01/12/2025</a:t>
             </a:fld>
             <a:endParaRPr lang="en-IL"/>
           </a:p>
@@ -1418,7 +1419,7 @@
           <a:p>
             <a:fld id="{11FE3B9D-47C6-4666-9B3D-CDF6210FE922}" type="datetimeFigureOut">
               <a:rPr lang="en-IL" smtClean="0"/>
-              <a:t>28/07/2024</a:t>
+              <a:t>01/12/2025</a:t>
             </a:fld>
             <a:endParaRPr lang="en-IL"/>
           </a:p>
@@ -1833,7 +1834,7 @@
           <a:p>
             <a:fld id="{11FE3B9D-47C6-4666-9B3D-CDF6210FE922}" type="datetimeFigureOut">
               <a:rPr lang="en-IL" smtClean="0"/>
-              <a:t>28/07/2024</a:t>
+              <a:t>01/12/2025</a:t>
             </a:fld>
             <a:endParaRPr lang="en-IL"/>
           </a:p>
@@ -1975,7 +1976,7 @@
           <a:p>
             <a:fld id="{11FE3B9D-47C6-4666-9B3D-CDF6210FE922}" type="datetimeFigureOut">
               <a:rPr lang="en-IL" smtClean="0"/>
-              <a:t>28/07/2024</a:t>
+              <a:t>01/12/2025</a:t>
             </a:fld>
             <a:endParaRPr lang="en-IL"/>
           </a:p>
@@ -2088,7 +2089,7 @@
           <a:p>
             <a:fld id="{11FE3B9D-47C6-4666-9B3D-CDF6210FE922}" type="datetimeFigureOut">
               <a:rPr lang="en-IL" smtClean="0"/>
-              <a:t>28/07/2024</a:t>
+              <a:t>01/12/2025</a:t>
             </a:fld>
             <a:endParaRPr lang="en-IL"/>
           </a:p>
@@ -2401,7 +2402,7 @@
           <a:p>
             <a:fld id="{11FE3B9D-47C6-4666-9B3D-CDF6210FE922}" type="datetimeFigureOut">
               <a:rPr lang="en-IL" smtClean="0"/>
-              <a:t>28/07/2024</a:t>
+              <a:t>01/12/2025</a:t>
             </a:fld>
             <a:endParaRPr lang="en-IL"/>
           </a:p>
@@ -2690,7 +2691,7 @@
           <a:p>
             <a:fld id="{11FE3B9D-47C6-4666-9B3D-CDF6210FE922}" type="datetimeFigureOut">
               <a:rPr lang="en-IL" smtClean="0"/>
-              <a:t>28/07/2024</a:t>
+              <a:t>01/12/2025</a:t>
             </a:fld>
             <a:endParaRPr lang="en-IL"/>
           </a:p>
@@ -2933,7 +2934,7 @@
           <a:p>
             <a:fld id="{11FE3B9D-47C6-4666-9B3D-CDF6210FE922}" type="datetimeFigureOut">
               <a:rPr lang="en-IL" smtClean="0"/>
-              <a:t>28/07/2024</a:t>
+              <a:t>01/12/2025</a:t>
             </a:fld>
             <a:endParaRPr lang="en-IL"/>
           </a:p>
@@ -3443,6 +3444,138 @@
           <p:cNvPr id="2" name="Title 1">
             <a:extLst>
               <a:ext uri="{FF2B5EF4-FFF2-40B4-BE49-F238E27FC236}">
+                <a16:creationId xmlns:a16="http://schemas.microsoft.com/office/drawing/2014/main" id="{5F4B6AFF-91B4-6243-5F82-D785EA649048}"/>
+              </a:ext>
+            </a:extLst>
+          </p:cNvPr>
+          <p:cNvSpPr>
+            <a:spLocks noGrp="1"/>
+          </p:cNvSpPr>
+          <p:nvPr>
+            <p:ph type="title"/>
+          </p:nvPr>
+        </p:nvSpPr>
+        <p:spPr/>
+        <p:txBody>
+          <a:bodyPr/>
+          <a:lstStyle/>
+          <a:p>
+            <a:r>
+              <a:rPr lang="en-US" dirty="0"/>
+              <a:t>Background - </a:t>
+            </a:r>
+            <a:r>
+              <a:rPr lang="en-US" dirty="0" err="1"/>
+              <a:t>LayerNorm</a:t>
+            </a:r>
+            <a:endParaRPr lang="en-IL" dirty="0"/>
+          </a:p>
+        </p:txBody>
+      </p:sp>
+      <p:sp>
+        <p:nvSpPr>
+          <p:cNvPr id="3" name="Content Placeholder 2">
+            <a:extLst>
+              <a:ext uri="{FF2B5EF4-FFF2-40B4-BE49-F238E27FC236}">
+                <a16:creationId xmlns:a16="http://schemas.microsoft.com/office/drawing/2014/main" id="{32384348-41C6-0C90-BE62-81F5E31FBEBD}"/>
+              </a:ext>
+            </a:extLst>
+          </p:cNvPr>
+          <p:cNvSpPr>
+            <a:spLocks noGrp="1"/>
+          </p:cNvSpPr>
+          <p:nvPr>
+            <p:ph idx="1"/>
+          </p:nvPr>
+        </p:nvSpPr>
+        <p:spPr/>
+        <p:txBody>
+          <a:bodyPr>
+            <a:normAutofit/>
+          </a:bodyPr>
+          <a:lstStyle/>
+          <a:p>
+            <a:r>
+              <a:rPr lang="en-US" sz="2400" dirty="0"/>
+              <a:t>Normalizes each sample independently across its feature (channel) dim</a:t>
+            </a:r>
+          </a:p>
+          <a:p>
+            <a:r>
+              <a:rPr lang="en-US" sz="2400" dirty="0" err="1"/>
+              <a:t>PyTorch’s</a:t>
+            </a:r>
+            <a:r>
+              <a:rPr lang="en-US" sz="2400" dirty="0"/>
+              <a:t> </a:t>
+            </a:r>
+            <a:r>
+              <a:rPr lang="en-US" sz="2400" dirty="0" err="1"/>
+              <a:t>LayerNorm</a:t>
+            </a:r>
+            <a:r>
+              <a:rPr lang="en-US" sz="2400" dirty="0"/>
+              <a:t> computes one mean per token</a:t>
+            </a:r>
+          </a:p>
+          <a:p>
+            <a:pPr lvl="1"/>
+            <a:r>
+              <a:rPr lang="en-US" sz="2000" dirty="0"/>
+              <a:t>Example: with (B,T,D)=(2,10,100) there are B×T=20 different mean values, each covering its 100 channels</a:t>
+            </a:r>
+          </a:p>
+          <a:p>
+            <a:r>
+              <a:rPr lang="en-US" sz="2400" dirty="0"/>
+              <a:t>Doesn’t maintain running statistics</a:t>
+            </a:r>
+          </a:p>
+          <a:p>
+            <a:pPr lvl="1"/>
+            <a:r>
+              <a:rPr lang="en-US" sz="2000" dirty="0"/>
+              <a:t>Inference uses the current input’s per-token mean and variance in the same way as training, then applies the learned gamma/beta affine parameters</a:t>
+            </a:r>
+            <a:endParaRPr lang="en-IL" sz="2000" dirty="0"/>
+          </a:p>
+        </p:txBody>
+      </p:sp>
+    </p:spTree>
+    <p:extLst>
+      <p:ext uri="{BB962C8B-B14F-4D97-AF65-F5344CB8AC3E}">
+        <p14:creationId xmlns:p14="http://schemas.microsoft.com/office/powerpoint/2010/main" val="2035013120"/>
+      </p:ext>
+    </p:extLst>
+  </p:cSld>
+  <p:clrMapOvr>
+    <a:masterClrMapping/>
+  </p:clrMapOvr>
+</p:sld>
+</file>
+
+<file path=ppt/slides/slide3.xml><?xml version="1.0" encoding="utf-8"?>
+<p:sld xmlns:a="http://schemas.openxmlformats.org/drawingml/2006/main" xmlns:r="http://schemas.openxmlformats.org/officeDocument/2006/relationships" xmlns:p="http://schemas.openxmlformats.org/presentationml/2006/main">
+  <p:cSld>
+    <p:spTree>
+      <p:nvGrpSpPr>
+        <p:cNvPr id="1" name=""/>
+        <p:cNvGrpSpPr/>
+        <p:nvPr/>
+      </p:nvGrpSpPr>
+      <p:grpSpPr>
+        <a:xfrm>
+          <a:off x="0" y="0"/>
+          <a:ext cx="0" cy="0"/>
+          <a:chOff x="0" y="0"/>
+          <a:chExt cx="0" cy="0"/>
+        </a:xfrm>
+      </p:grpSpPr>
+      <p:sp>
+        <p:nvSpPr>
+          <p:cNvPr id="2" name="Title 1">
+            <a:extLst>
+              <a:ext uri="{FF2B5EF4-FFF2-40B4-BE49-F238E27FC236}">
                 <a16:creationId xmlns:a16="http://schemas.microsoft.com/office/drawing/2014/main" id="{1C268819-9595-1D87-6991-C6A13BE44991}"/>
               </a:ext>
             </a:extLst>
@@ -3969,7 +4102,7 @@
 </p:sld>
 </file>
 
-<file path=ppt/slides/slide3.xml><?xml version="1.0" encoding="utf-8"?>
+<file path=ppt/slides/slide4.xml><?xml version="1.0" encoding="utf-8"?>
 <p:sld xmlns:a="http://schemas.openxmlformats.org/drawingml/2006/main" xmlns:r="http://schemas.openxmlformats.org/officeDocument/2006/relationships" xmlns:p="http://schemas.openxmlformats.org/presentationml/2006/main">
   <p:cSld>
     <p:spTree>
@@ -4092,7 +4225,7 @@
 </p:sld>
 </file>
 
-<file path=ppt/slides/slide4.xml><?xml version="1.0" encoding="utf-8"?>
+<file path=ppt/slides/slide5.xml><?xml version="1.0" encoding="utf-8"?>
 <p:sld xmlns:a="http://schemas.openxmlformats.org/drawingml/2006/main" xmlns:r="http://schemas.openxmlformats.org/officeDocument/2006/relationships" xmlns:p="http://schemas.openxmlformats.org/presentationml/2006/main">
   <p:cSld>
     <p:spTree>

</xml_diff>